<commit_message>
Session 11 - Setup slides
</commit_message>
<xml_diff>
--- a/slides/img/session-01/graphics-session_01-16_9.pptx
+++ b/slides/img/session-01/graphics-session_01-16_9.pptx
@@ -200,7 +200,7 @@
           <a:p>
             <a:fld id="{9E7D78CA-C3B5-B64F-AEEF-BB3F0CC59486}" type="datetimeFigureOut">
               <a:rPr lang="de-DE" smtClean="0"/>
-              <a:t>24.10.23</a:t>
+              <a:t>23.01.24</a:t>
             </a:fld>
             <a:endParaRPr lang="de-DE"/>
           </a:p>
@@ -698,7 +698,7 @@
           <a:p>
             <a:fld id="{05844293-2F53-DD49-A051-D1C1CF164266}" type="datetimeFigureOut">
               <a:rPr lang="de-DE" smtClean="0"/>
-              <a:t>24.10.23</a:t>
+              <a:t>23.01.24</a:t>
             </a:fld>
             <a:endParaRPr lang="de-DE"/>
           </a:p>
@@ -896,7 +896,7 @@
           <a:p>
             <a:fld id="{05844293-2F53-DD49-A051-D1C1CF164266}" type="datetimeFigureOut">
               <a:rPr lang="de-DE" smtClean="0"/>
-              <a:t>24.10.23</a:t>
+              <a:t>23.01.24</a:t>
             </a:fld>
             <a:endParaRPr lang="de-DE"/>
           </a:p>
@@ -1104,7 +1104,7 @@
           <a:p>
             <a:fld id="{05844293-2F53-DD49-A051-D1C1CF164266}" type="datetimeFigureOut">
               <a:rPr lang="de-DE" smtClean="0"/>
-              <a:t>24.10.23</a:t>
+              <a:t>23.01.24</a:t>
             </a:fld>
             <a:endParaRPr lang="de-DE"/>
           </a:p>
@@ -1302,7 +1302,7 @@
           <a:p>
             <a:fld id="{05844293-2F53-DD49-A051-D1C1CF164266}" type="datetimeFigureOut">
               <a:rPr lang="de-DE" smtClean="0"/>
-              <a:t>24.10.23</a:t>
+              <a:t>23.01.24</a:t>
             </a:fld>
             <a:endParaRPr lang="de-DE"/>
           </a:p>
@@ -1577,7 +1577,7 @@
           <a:p>
             <a:fld id="{05844293-2F53-DD49-A051-D1C1CF164266}" type="datetimeFigureOut">
               <a:rPr lang="de-DE" smtClean="0"/>
-              <a:t>24.10.23</a:t>
+              <a:t>23.01.24</a:t>
             </a:fld>
             <a:endParaRPr lang="de-DE"/>
           </a:p>
@@ -1842,7 +1842,7 @@
           <a:p>
             <a:fld id="{05844293-2F53-DD49-A051-D1C1CF164266}" type="datetimeFigureOut">
               <a:rPr lang="de-DE" smtClean="0"/>
-              <a:t>24.10.23</a:t>
+              <a:t>23.01.24</a:t>
             </a:fld>
             <a:endParaRPr lang="de-DE"/>
           </a:p>
@@ -2254,7 +2254,7 @@
           <a:p>
             <a:fld id="{05844293-2F53-DD49-A051-D1C1CF164266}" type="datetimeFigureOut">
               <a:rPr lang="de-DE" smtClean="0"/>
-              <a:t>24.10.23</a:t>
+              <a:t>23.01.24</a:t>
             </a:fld>
             <a:endParaRPr lang="de-DE"/>
           </a:p>
@@ -2395,7 +2395,7 @@
           <a:p>
             <a:fld id="{05844293-2F53-DD49-A051-D1C1CF164266}" type="datetimeFigureOut">
               <a:rPr lang="de-DE" smtClean="0"/>
-              <a:t>24.10.23</a:t>
+              <a:t>23.01.24</a:t>
             </a:fld>
             <a:endParaRPr lang="de-DE"/>
           </a:p>
@@ -2508,7 +2508,7 @@
           <a:p>
             <a:fld id="{05844293-2F53-DD49-A051-D1C1CF164266}" type="datetimeFigureOut">
               <a:rPr lang="de-DE" smtClean="0"/>
-              <a:t>24.10.23</a:t>
+              <a:t>23.01.24</a:t>
             </a:fld>
             <a:endParaRPr lang="de-DE"/>
           </a:p>
@@ -2819,7 +2819,7 @@
           <a:p>
             <a:fld id="{05844293-2F53-DD49-A051-D1C1CF164266}" type="datetimeFigureOut">
               <a:rPr lang="de-DE" smtClean="0"/>
-              <a:t>24.10.23</a:t>
+              <a:t>23.01.24</a:t>
             </a:fld>
             <a:endParaRPr lang="de-DE"/>
           </a:p>
@@ -3107,7 +3107,7 @@
           <a:p>
             <a:fld id="{05844293-2F53-DD49-A051-D1C1CF164266}" type="datetimeFigureOut">
               <a:rPr lang="de-DE" smtClean="0"/>
-              <a:t>24.10.23</a:t>
+              <a:t>23.01.24</a:t>
             </a:fld>
             <a:endParaRPr lang="de-DE"/>
           </a:p>
@@ -3348,7 +3348,7 @@
           <a:p>
             <a:fld id="{05844293-2F53-DD49-A051-D1C1CF164266}" type="datetimeFigureOut">
               <a:rPr lang="de-DE" smtClean="0"/>
-              <a:t>24.10.23</a:t>
+              <a:t>23.01.24</a:t>
             </a:fld>
             <a:endParaRPr lang="de-DE"/>
           </a:p>
@@ -3779,7 +3779,7 @@
         </p:nvSpPr>
         <p:spPr>
           <a:xfrm>
-            <a:off x="1030157" y="1400783"/>
+            <a:off x="969600" y="1316160"/>
             <a:ext cx="7095914" cy="4625352"/>
           </a:xfrm>
           <a:prstGeom prst="swooshArrow">
@@ -3854,7 +3854,7 @@
         </p:blipFill>
         <p:spPr>
           <a:xfrm>
-            <a:off x="8382876" y="1019965"/>
+            <a:off x="8322319" y="935342"/>
             <a:ext cx="3156047" cy="2805376"/>
           </a:xfrm>
           <a:prstGeom prst="rect">
@@ -3876,7 +3876,7 @@
         </p:nvSpPr>
         <p:spPr>
           <a:xfrm rot="3289674">
-            <a:off x="4825929" y="889562"/>
+            <a:off x="4765372" y="804939"/>
             <a:ext cx="1789871" cy="1832431"/>
           </a:xfrm>
           <a:prstGeom prst="leftCircularArrow">
@@ -3955,7 +3955,7 @@
         </p:blipFill>
         <p:spPr>
           <a:xfrm>
-            <a:off x="5352613" y="2017412"/>
+            <a:off x="5292056" y="1932789"/>
             <a:ext cx="879180" cy="1318770"/>
           </a:xfrm>
           <a:prstGeom prst="rect">
@@ -3977,7 +3977,7 @@
         </p:nvSpPr>
         <p:spPr>
           <a:xfrm>
-            <a:off x="924952" y="6090067"/>
+            <a:off x="864395" y="6005444"/>
             <a:ext cx="1326004" cy="584775"/>
           </a:xfrm>
           <a:prstGeom prst="rect">
@@ -4048,7 +4048,7 @@
         </p:nvSpPr>
         <p:spPr>
           <a:xfrm>
-            <a:off x="8616895" y="3914641"/>
+            <a:off x="8556338" y="3830018"/>
             <a:ext cx="1636987" cy="677108"/>
           </a:xfrm>
           <a:prstGeom prst="rect">
@@ -4149,7 +4149,7 @@
         </p:blipFill>
         <p:spPr>
           <a:xfrm>
-            <a:off x="1203581" y="4591749"/>
+            <a:off x="1143024" y="4507126"/>
             <a:ext cx="1618006" cy="1618006"/>
           </a:xfrm>
           <a:prstGeom prst="rect">
@@ -4171,7 +4171,7 @@
         </p:nvSpPr>
         <p:spPr>
           <a:xfrm>
-            <a:off x="3200529" y="3601577"/>
+            <a:off x="3139972" y="3516954"/>
             <a:ext cx="223764" cy="223764"/>
           </a:xfrm>
           <a:prstGeom prst="ellipse">
@@ -4239,7 +4239,7 @@
         </p:blipFill>
         <p:spPr>
           <a:xfrm>
-            <a:off x="3455940" y="3138824"/>
+            <a:off x="3395383" y="3054201"/>
             <a:ext cx="1000473" cy="1000473"/>
           </a:xfrm>
           <a:prstGeom prst="rect">
@@ -4261,7 +4261,7 @@
         </p:nvSpPr>
         <p:spPr>
           <a:xfrm>
-            <a:off x="3312411" y="4066877"/>
+            <a:off x="3251854" y="3982254"/>
             <a:ext cx="1390124" cy="861774"/>
           </a:xfrm>
           <a:prstGeom prst="rect">
@@ -4386,7 +4386,7 @@
         </p:nvSpPr>
         <p:spPr>
           <a:xfrm>
-            <a:off x="5307935" y="3429000"/>
+            <a:off x="5247378" y="3344377"/>
             <a:ext cx="968535" cy="861774"/>
           </a:xfrm>
           <a:prstGeom prst="rect">
@@ -4470,7 +4470,7 @@
         </p:nvSpPr>
         <p:spPr>
           <a:xfrm>
-            <a:off x="5036555" y="2777158"/>
+            <a:off x="4975998" y="2692535"/>
             <a:ext cx="223764" cy="223764"/>
           </a:xfrm>
           <a:prstGeom prst="ellipse">
@@ -4524,7 +4524,7 @@
         </p:nvSpPr>
         <p:spPr>
           <a:xfrm>
-            <a:off x="979817" y="5840101"/>
+            <a:off x="919260" y="5755478"/>
             <a:ext cx="223764" cy="223764"/>
           </a:xfrm>
           <a:prstGeom prst="ellipse">
@@ -4578,7 +4578,7 @@
         </p:nvSpPr>
         <p:spPr>
           <a:xfrm>
-            <a:off x="6647272" y="507233"/>
+            <a:off x="6586715" y="422610"/>
             <a:ext cx="1295547" cy="584775"/>
           </a:xfrm>
           <a:prstGeom prst="rect">
@@ -4663,7 +4663,7 @@
         </p:blipFill>
         <p:spPr>
           <a:xfrm>
-            <a:off x="5732872" y="253165"/>
+            <a:off x="5672315" y="168542"/>
             <a:ext cx="914400" cy="914400"/>
           </a:xfrm>
           <a:prstGeom prst="rect">
@@ -4671,6 +4671,435 @@
           </a:prstGeom>
         </p:spPr>
       </p:pic>
+      <p:cxnSp>
+        <p:nvCxnSpPr>
+          <p:cNvPr id="4" name="Gerade Verbindung mit Pfeil 3">
+            <a:extLst>
+              <a:ext uri="{FF2B5EF4-FFF2-40B4-BE49-F238E27FC236}">
+                <a16:creationId xmlns:a16="http://schemas.microsoft.com/office/drawing/2014/main" id="{78261287-962A-21B5-C145-C1956FD6862E}"/>
+              </a:ext>
+            </a:extLst>
+          </p:cNvPr>
+          <p:cNvCxnSpPr>
+            <a:cxnSpLocks/>
+          </p:cNvCxnSpPr>
+          <p:nvPr/>
+        </p:nvCxnSpPr>
+        <p:spPr>
+          <a:xfrm>
+            <a:off x="2925821" y="5941512"/>
+            <a:ext cx="6392304" cy="0"/>
+          </a:xfrm>
+          <a:prstGeom prst="straightConnector1">
+            <a:avLst/>
+          </a:prstGeom>
+          <a:ln w="50800">
+            <a:solidFill>
+              <a:srgbClr val="662938"/>
+            </a:solidFill>
+            <a:miter lim="800000"/>
+            <a:tailEnd type="oval"/>
+          </a:ln>
+        </p:spPr>
+        <p:style>
+          <a:lnRef idx="1">
+            <a:schemeClr val="accent1"/>
+          </a:lnRef>
+          <a:fillRef idx="0">
+            <a:schemeClr val="accent1"/>
+          </a:fillRef>
+          <a:effectRef idx="0">
+            <a:schemeClr val="accent1"/>
+          </a:effectRef>
+          <a:fontRef idx="minor">
+            <a:schemeClr val="tx1"/>
+          </a:fontRef>
+        </p:style>
+      </p:cxnSp>
+      <p:cxnSp>
+        <p:nvCxnSpPr>
+          <p:cNvPr id="14" name="Gerade Verbindung mit Pfeil 13">
+            <a:extLst>
+              <a:ext uri="{FF2B5EF4-FFF2-40B4-BE49-F238E27FC236}">
+                <a16:creationId xmlns:a16="http://schemas.microsoft.com/office/drawing/2014/main" id="{04A47E73-F059-71BB-C0CC-1A340A76BB50}"/>
+              </a:ext>
+            </a:extLst>
+          </p:cNvPr>
+          <p:cNvCxnSpPr>
+            <a:cxnSpLocks/>
+          </p:cNvCxnSpPr>
+          <p:nvPr/>
+        </p:nvCxnSpPr>
+        <p:spPr>
+          <a:xfrm flipV="1">
+            <a:off x="5660307" y="4206151"/>
+            <a:ext cx="0" cy="1198444"/>
+          </a:xfrm>
+          <a:prstGeom prst="straightConnector1">
+            <a:avLst/>
+          </a:prstGeom>
+          <a:ln w="6350">
+            <a:solidFill>
+              <a:srgbClr val="662938"/>
+            </a:solidFill>
+            <a:prstDash val="sysDot"/>
+            <a:miter lim="800000"/>
+            <a:tailEnd type="oval"/>
+          </a:ln>
+        </p:spPr>
+        <p:style>
+          <a:lnRef idx="1">
+            <a:schemeClr val="accent1"/>
+          </a:lnRef>
+          <a:fillRef idx="0">
+            <a:schemeClr val="accent1"/>
+          </a:fillRef>
+          <a:effectRef idx="0">
+            <a:schemeClr val="accent1"/>
+          </a:effectRef>
+          <a:fontRef idx="minor">
+            <a:schemeClr val="tx1"/>
+          </a:fontRef>
+        </p:style>
+      </p:cxnSp>
+      <p:sp>
+        <p:nvSpPr>
+          <p:cNvPr id="24" name="Textfeld 23">
+            <a:extLst>
+              <a:ext uri="{FF2B5EF4-FFF2-40B4-BE49-F238E27FC236}">
+                <a16:creationId xmlns:a16="http://schemas.microsoft.com/office/drawing/2014/main" id="{7276BD1B-0FD8-9671-2363-EED94AADAE23}"/>
+              </a:ext>
+            </a:extLst>
+          </p:cNvPr>
+          <p:cNvSpPr txBox="1"/>
+          <p:nvPr/>
+        </p:nvSpPr>
+        <p:spPr>
+          <a:xfrm>
+            <a:off x="3441007" y="5448565"/>
+            <a:ext cx="909223" cy="461665"/>
+          </a:xfrm>
+          <a:prstGeom prst="rect">
+            <a:avLst/>
+          </a:prstGeom>
+          <a:noFill/>
+        </p:spPr>
+        <p:txBody>
+          <a:bodyPr wrap="none" rtlCol="0">
+            <a:spAutoFit/>
+          </a:bodyPr>
+          <a:lstStyle/>
+          <a:p>
+            <a:r>
+              <a:rPr lang="de-DE" sz="2400" b="1" dirty="0">
+                <a:solidFill>
+                  <a:srgbClr val="971B2F"/>
+                </a:solidFill>
+                <a:latin typeface="News Cycle" panose="02000503000000000000" pitchFamily="2" charset="2"/>
+                <a:ea typeface="Noto Mono for Powerline" panose="020B0609030804020204" pitchFamily="49" charset="0"/>
+                <a:cs typeface="Noto Mono for Powerline" panose="020B0609030804020204" pitchFamily="49" charset="0"/>
+              </a:rPr>
+              <a:t>31.01.</a:t>
+            </a:r>
+            <a:endParaRPr lang="de-DE" sz="1600" dirty="0">
+              <a:solidFill>
+                <a:srgbClr val="971B2F"/>
+              </a:solidFill>
+              <a:latin typeface="News Cycle" panose="02000503000000000000" pitchFamily="2" charset="2"/>
+              <a:ea typeface="Noto Mono for Powerline" panose="020B0609030804020204" pitchFamily="49" charset="0"/>
+              <a:cs typeface="Noto Mono for Powerline" panose="020B0609030804020204" pitchFamily="49" charset="0"/>
+            </a:endParaRPr>
+          </a:p>
+        </p:txBody>
+      </p:sp>
+      <p:cxnSp>
+        <p:nvCxnSpPr>
+          <p:cNvPr id="30" name="Gerade Verbindung mit Pfeil 29">
+            <a:extLst>
+              <a:ext uri="{FF2B5EF4-FFF2-40B4-BE49-F238E27FC236}">
+                <a16:creationId xmlns:a16="http://schemas.microsoft.com/office/drawing/2014/main" id="{627F7465-A97B-8DCF-9F59-8A350532EC6B}"/>
+              </a:ext>
+            </a:extLst>
+          </p:cNvPr>
+          <p:cNvCxnSpPr>
+            <a:cxnSpLocks/>
+          </p:cNvCxnSpPr>
+          <p:nvPr/>
+        </p:nvCxnSpPr>
+        <p:spPr>
+          <a:xfrm flipV="1">
+            <a:off x="3853226" y="4844028"/>
+            <a:ext cx="0" cy="560567"/>
+          </a:xfrm>
+          <a:prstGeom prst="straightConnector1">
+            <a:avLst/>
+          </a:prstGeom>
+          <a:ln w="6350">
+            <a:solidFill>
+              <a:srgbClr val="662938"/>
+            </a:solidFill>
+            <a:prstDash val="sysDot"/>
+            <a:miter lim="800000"/>
+            <a:tailEnd type="oval"/>
+          </a:ln>
+        </p:spPr>
+        <p:style>
+          <a:lnRef idx="1">
+            <a:schemeClr val="accent1"/>
+          </a:lnRef>
+          <a:fillRef idx="0">
+            <a:schemeClr val="accent1"/>
+          </a:fillRef>
+          <a:effectRef idx="0">
+            <a:schemeClr val="accent1"/>
+          </a:effectRef>
+          <a:fontRef idx="minor">
+            <a:schemeClr val="tx1"/>
+          </a:fontRef>
+        </p:style>
+      </p:cxnSp>
+      <p:cxnSp>
+        <p:nvCxnSpPr>
+          <p:cNvPr id="31" name="Gerade Verbindung mit Pfeil 30">
+            <a:extLst>
+              <a:ext uri="{FF2B5EF4-FFF2-40B4-BE49-F238E27FC236}">
+                <a16:creationId xmlns:a16="http://schemas.microsoft.com/office/drawing/2014/main" id="{9AFDB4EF-ABF4-5A00-882D-CE0C37A65526}"/>
+              </a:ext>
+            </a:extLst>
+          </p:cNvPr>
+          <p:cNvCxnSpPr>
+            <a:cxnSpLocks/>
+          </p:cNvCxnSpPr>
+          <p:nvPr/>
+        </p:nvCxnSpPr>
+        <p:spPr>
+          <a:xfrm flipV="1">
+            <a:off x="7129551" y="1007385"/>
+            <a:ext cx="0" cy="4397210"/>
+          </a:xfrm>
+          <a:prstGeom prst="straightConnector1">
+            <a:avLst/>
+          </a:prstGeom>
+          <a:ln w="6350">
+            <a:solidFill>
+              <a:srgbClr val="662938"/>
+            </a:solidFill>
+            <a:prstDash val="sysDot"/>
+            <a:miter lim="800000"/>
+            <a:tailEnd type="oval"/>
+          </a:ln>
+        </p:spPr>
+        <p:style>
+          <a:lnRef idx="1">
+            <a:schemeClr val="accent1"/>
+          </a:lnRef>
+          <a:fillRef idx="0">
+            <a:schemeClr val="accent1"/>
+          </a:fillRef>
+          <a:effectRef idx="0">
+            <a:schemeClr val="accent1"/>
+          </a:effectRef>
+          <a:fontRef idx="minor">
+            <a:schemeClr val="tx1"/>
+          </a:fontRef>
+        </p:style>
+      </p:cxnSp>
+      <p:cxnSp>
+        <p:nvCxnSpPr>
+          <p:cNvPr id="32" name="Gerade Verbindung mit Pfeil 31">
+            <a:extLst>
+              <a:ext uri="{FF2B5EF4-FFF2-40B4-BE49-F238E27FC236}">
+                <a16:creationId xmlns:a16="http://schemas.microsoft.com/office/drawing/2014/main" id="{10EAF0BB-71B5-D846-9126-BDFC2A6B354A}"/>
+              </a:ext>
+            </a:extLst>
+          </p:cNvPr>
+          <p:cNvCxnSpPr>
+            <a:cxnSpLocks/>
+          </p:cNvCxnSpPr>
+          <p:nvPr/>
+        </p:nvCxnSpPr>
+        <p:spPr>
+          <a:xfrm flipV="1">
+            <a:off x="9318125" y="4507126"/>
+            <a:ext cx="0" cy="897469"/>
+          </a:xfrm>
+          <a:prstGeom prst="straightConnector1">
+            <a:avLst/>
+          </a:prstGeom>
+          <a:ln w="6350">
+            <a:solidFill>
+              <a:srgbClr val="662938"/>
+            </a:solidFill>
+            <a:prstDash val="sysDot"/>
+            <a:miter lim="800000"/>
+            <a:tailEnd type="oval"/>
+          </a:ln>
+        </p:spPr>
+        <p:style>
+          <a:lnRef idx="1">
+            <a:schemeClr val="accent1"/>
+          </a:lnRef>
+          <a:fillRef idx="0">
+            <a:schemeClr val="accent1"/>
+          </a:fillRef>
+          <a:effectRef idx="0">
+            <a:schemeClr val="accent1"/>
+          </a:effectRef>
+          <a:fontRef idx="minor">
+            <a:schemeClr val="tx1"/>
+          </a:fontRef>
+        </p:style>
+      </p:cxnSp>
+      <p:sp>
+        <p:nvSpPr>
+          <p:cNvPr id="35" name="Textfeld 34">
+            <a:extLst>
+              <a:ext uri="{FF2B5EF4-FFF2-40B4-BE49-F238E27FC236}">
+                <a16:creationId xmlns:a16="http://schemas.microsoft.com/office/drawing/2014/main" id="{F8EC5B25-F4D9-F618-282C-313C9B44F8A4}"/>
+              </a:ext>
+            </a:extLst>
+          </p:cNvPr>
+          <p:cNvSpPr txBox="1"/>
+          <p:nvPr/>
+        </p:nvSpPr>
+        <p:spPr>
+          <a:xfrm>
+            <a:off x="5276231" y="5448567"/>
+            <a:ext cx="910827" cy="461665"/>
+          </a:xfrm>
+          <a:prstGeom prst="rect">
+            <a:avLst/>
+          </a:prstGeom>
+          <a:noFill/>
+        </p:spPr>
+        <p:txBody>
+          <a:bodyPr wrap="none" rtlCol="0">
+            <a:spAutoFit/>
+          </a:bodyPr>
+          <a:lstStyle/>
+          <a:p>
+            <a:r>
+              <a:rPr lang="de-DE" sz="2400" b="1" dirty="0">
+                <a:solidFill>
+                  <a:srgbClr val="971B2F"/>
+                </a:solidFill>
+                <a:latin typeface="News Cycle" panose="02000503000000000000" pitchFamily="2" charset="2"/>
+                <a:ea typeface="Noto Mono for Powerline" panose="020B0609030804020204" pitchFamily="49" charset="0"/>
+                <a:cs typeface="Noto Mono for Powerline" panose="020B0609030804020204" pitchFamily="49" charset="0"/>
+              </a:rPr>
+              <a:t>11.02.</a:t>
+            </a:r>
+            <a:endParaRPr lang="de-DE" sz="1600" dirty="0">
+              <a:solidFill>
+                <a:srgbClr val="971B2F"/>
+              </a:solidFill>
+              <a:latin typeface="News Cycle" panose="02000503000000000000" pitchFamily="2" charset="2"/>
+              <a:ea typeface="Noto Mono for Powerline" panose="020B0609030804020204" pitchFamily="49" charset="0"/>
+              <a:cs typeface="Noto Mono for Powerline" panose="020B0609030804020204" pitchFamily="49" charset="0"/>
+            </a:endParaRPr>
+          </a:p>
+        </p:txBody>
+      </p:sp>
+      <p:sp>
+        <p:nvSpPr>
+          <p:cNvPr id="36" name="Textfeld 35">
+            <a:extLst>
+              <a:ext uri="{FF2B5EF4-FFF2-40B4-BE49-F238E27FC236}">
+                <a16:creationId xmlns:a16="http://schemas.microsoft.com/office/drawing/2014/main" id="{691774E8-9FAD-1461-C964-B5F168B29BAE}"/>
+              </a:ext>
+            </a:extLst>
+          </p:cNvPr>
+          <p:cNvSpPr txBox="1"/>
+          <p:nvPr/>
+        </p:nvSpPr>
+        <p:spPr>
+          <a:xfrm>
+            <a:off x="6686175" y="5448565"/>
+            <a:ext cx="1096625" cy="461665"/>
+          </a:xfrm>
+          <a:prstGeom prst="rect">
+            <a:avLst/>
+          </a:prstGeom>
+          <a:noFill/>
+        </p:spPr>
+        <p:txBody>
+          <a:bodyPr wrap="square" rtlCol="0">
+            <a:spAutoFit/>
+          </a:bodyPr>
+          <a:lstStyle/>
+          <a:p>
+            <a:r>
+              <a:rPr lang="de-DE" sz="2400" b="1" dirty="0">
+                <a:solidFill>
+                  <a:srgbClr val="971B2F"/>
+                </a:solidFill>
+                <a:latin typeface="News Cycle" panose="02000503000000000000" pitchFamily="2" charset="2"/>
+                <a:ea typeface="Noto Mono for Powerline" panose="020B0609030804020204" pitchFamily="49" charset="0"/>
+                <a:cs typeface="Noto Mono for Powerline" panose="020B0609030804020204" pitchFamily="49" charset="0"/>
+              </a:rPr>
+              <a:t>18.02.</a:t>
+            </a:r>
+            <a:endParaRPr lang="de-DE" sz="2400" dirty="0">
+              <a:solidFill>
+                <a:srgbClr val="971B2F"/>
+              </a:solidFill>
+              <a:latin typeface="News Cycle" panose="02000503000000000000" pitchFamily="2" charset="2"/>
+              <a:ea typeface="Noto Mono for Powerline" panose="020B0609030804020204" pitchFamily="49" charset="0"/>
+              <a:cs typeface="Noto Mono for Powerline" panose="020B0609030804020204" pitchFamily="49" charset="0"/>
+            </a:endParaRPr>
+          </a:p>
+        </p:txBody>
+      </p:sp>
+      <p:sp>
+        <p:nvSpPr>
+          <p:cNvPr id="37" name="Textfeld 36">
+            <a:extLst>
+              <a:ext uri="{FF2B5EF4-FFF2-40B4-BE49-F238E27FC236}">
+                <a16:creationId xmlns:a16="http://schemas.microsoft.com/office/drawing/2014/main" id="{520EBAFF-3E0B-CC96-DF97-D01C3A58989D}"/>
+              </a:ext>
+            </a:extLst>
+          </p:cNvPr>
+          <p:cNvSpPr txBox="1"/>
+          <p:nvPr/>
+        </p:nvSpPr>
+        <p:spPr>
+          <a:xfrm>
+            <a:off x="8902586" y="5448566"/>
+            <a:ext cx="944489" cy="461665"/>
+          </a:xfrm>
+          <a:prstGeom prst="rect">
+            <a:avLst/>
+          </a:prstGeom>
+          <a:noFill/>
+        </p:spPr>
+        <p:txBody>
+          <a:bodyPr wrap="none" rtlCol="0">
+            <a:spAutoFit/>
+          </a:bodyPr>
+          <a:lstStyle/>
+          <a:p>
+            <a:r>
+              <a:rPr lang="de-DE" sz="2400" b="1" dirty="0">
+                <a:solidFill>
+                  <a:srgbClr val="C50F3C"/>
+                </a:solidFill>
+                <a:latin typeface="News Cycle" panose="02000503000000000000" pitchFamily="2" charset="2"/>
+                <a:ea typeface="Noto Mono for Powerline" panose="020B0609030804020204" pitchFamily="49" charset="0"/>
+                <a:cs typeface="Noto Mono for Powerline" panose="020B0609030804020204" pitchFamily="49" charset="0"/>
+              </a:rPr>
+              <a:t>10.03.</a:t>
+            </a:r>
+            <a:endParaRPr lang="de-DE" sz="1600" dirty="0">
+              <a:solidFill>
+                <a:srgbClr val="C50F3C"/>
+              </a:solidFill>
+              <a:latin typeface="News Cycle" panose="02000503000000000000" pitchFamily="2" charset="2"/>
+              <a:ea typeface="Noto Mono for Powerline" panose="020B0609030804020204" pitchFamily="49" charset="0"/>
+              <a:cs typeface="Noto Mono for Powerline" panose="020B0609030804020204" pitchFamily="49" charset="0"/>
+            </a:endParaRPr>
+          </a:p>
+        </p:txBody>
+      </p:sp>
     </p:spTree>
     <p:extLst>
       <p:ext uri="{BB962C8B-B14F-4D97-AF65-F5344CB8AC3E}">

</xml_diff>